<commit_message>
Start of graph terrain search
</commit_message>
<xml_diff>
--- a/6022_Phys_2_(2025)/Day2Day/W02/Vertlet integration.pptx
+++ b/6022_Phys_2_(2025)/Day2Day/W02/Vertlet integration.pptx
@@ -251,7 +251,7 @@
           <a:p>
             <a:fld id="{B2683B1B-3CA0-49F0-913E-30D7B5476043}" type="datetimeFigureOut">
               <a:rPr lang="en-CA" smtClean="0"/>
-              <a:t>2025-01-13</a:t>
+              <a:t>2025-01-20</a:t>
             </a:fld>
             <a:endParaRPr lang="en-CA"/>
           </a:p>
@@ -421,7 +421,7 @@
           <a:p>
             <a:fld id="{B2683B1B-3CA0-49F0-913E-30D7B5476043}" type="datetimeFigureOut">
               <a:rPr lang="en-CA" smtClean="0"/>
-              <a:t>2025-01-13</a:t>
+              <a:t>2025-01-20</a:t>
             </a:fld>
             <a:endParaRPr lang="en-CA"/>
           </a:p>
@@ -601,7 +601,7 @@
           <a:p>
             <a:fld id="{B2683B1B-3CA0-49F0-913E-30D7B5476043}" type="datetimeFigureOut">
               <a:rPr lang="en-CA" smtClean="0"/>
-              <a:t>2025-01-13</a:t>
+              <a:t>2025-01-20</a:t>
             </a:fld>
             <a:endParaRPr lang="en-CA"/>
           </a:p>
@@ -771,7 +771,7 @@
           <a:p>
             <a:fld id="{B2683B1B-3CA0-49F0-913E-30D7B5476043}" type="datetimeFigureOut">
               <a:rPr lang="en-CA" smtClean="0"/>
-              <a:t>2025-01-13</a:t>
+              <a:t>2025-01-20</a:t>
             </a:fld>
             <a:endParaRPr lang="en-CA"/>
           </a:p>
@@ -1017,7 +1017,7 @@
           <a:p>
             <a:fld id="{B2683B1B-3CA0-49F0-913E-30D7B5476043}" type="datetimeFigureOut">
               <a:rPr lang="en-CA" smtClean="0"/>
-              <a:t>2025-01-13</a:t>
+              <a:t>2025-01-20</a:t>
             </a:fld>
             <a:endParaRPr lang="en-CA"/>
           </a:p>
@@ -1249,7 +1249,7 @@
           <a:p>
             <a:fld id="{B2683B1B-3CA0-49F0-913E-30D7B5476043}" type="datetimeFigureOut">
               <a:rPr lang="en-CA" smtClean="0"/>
-              <a:t>2025-01-13</a:t>
+              <a:t>2025-01-20</a:t>
             </a:fld>
             <a:endParaRPr lang="en-CA"/>
           </a:p>
@@ -1616,7 +1616,7 @@
           <a:p>
             <a:fld id="{B2683B1B-3CA0-49F0-913E-30D7B5476043}" type="datetimeFigureOut">
               <a:rPr lang="en-CA" smtClean="0"/>
-              <a:t>2025-01-13</a:t>
+              <a:t>2025-01-20</a:t>
             </a:fld>
             <a:endParaRPr lang="en-CA"/>
           </a:p>
@@ -1734,7 +1734,7 @@
           <a:p>
             <a:fld id="{B2683B1B-3CA0-49F0-913E-30D7B5476043}" type="datetimeFigureOut">
               <a:rPr lang="en-CA" smtClean="0"/>
-              <a:t>2025-01-13</a:t>
+              <a:t>2025-01-20</a:t>
             </a:fld>
             <a:endParaRPr lang="en-CA"/>
           </a:p>
@@ -1829,7 +1829,7 @@
           <a:p>
             <a:fld id="{B2683B1B-3CA0-49F0-913E-30D7B5476043}" type="datetimeFigureOut">
               <a:rPr lang="en-CA" smtClean="0"/>
-              <a:t>2025-01-13</a:t>
+              <a:t>2025-01-20</a:t>
             </a:fld>
             <a:endParaRPr lang="en-CA"/>
           </a:p>
@@ -2106,7 +2106,7 @@
           <a:p>
             <a:fld id="{B2683B1B-3CA0-49F0-913E-30D7B5476043}" type="datetimeFigureOut">
               <a:rPr lang="en-CA" smtClean="0"/>
-              <a:t>2025-01-13</a:t>
+              <a:t>2025-01-20</a:t>
             </a:fld>
             <a:endParaRPr lang="en-CA"/>
           </a:p>
@@ -2363,7 +2363,7 @@
           <a:p>
             <a:fld id="{B2683B1B-3CA0-49F0-913E-30D7B5476043}" type="datetimeFigureOut">
               <a:rPr lang="en-CA" smtClean="0"/>
-              <a:t>2025-01-13</a:t>
+              <a:t>2025-01-20</a:t>
             </a:fld>
             <a:endParaRPr lang="en-CA"/>
           </a:p>
@@ -2576,7 +2576,7 @@
           <a:p>
             <a:fld id="{B2683B1B-3CA0-49F0-913E-30D7B5476043}" type="datetimeFigureOut">
               <a:rPr lang="en-CA" smtClean="0"/>
-              <a:t>2025-01-13</a:t>
+              <a:t>2025-01-20</a:t>
             </a:fld>
             <a:endParaRPr lang="en-CA"/>
           </a:p>
@@ -3502,6 +3502,52 @@
           <a:chExt cx="0" cy="0"/>
         </a:xfrm>
       </p:grpSpPr>
+      <p:sp>
+        <p:nvSpPr>
+          <p:cNvPr id="2" name="Flowchart: Terminator 1">
+            <a:extLst>
+              <a:ext uri="{FF2B5EF4-FFF2-40B4-BE49-F238E27FC236}">
+                <a16:creationId xmlns:a16="http://schemas.microsoft.com/office/drawing/2014/main" id="{D66563BD-9A62-56F2-238D-A124C1B9F4B3}"/>
+              </a:ext>
+            </a:extLst>
+          </p:cNvPr>
+          <p:cNvSpPr/>
+          <p:nvPr/>
+        </p:nvSpPr>
+        <p:spPr>
+          <a:xfrm rot="3751417">
+            <a:off x="1610455" y="2524977"/>
+            <a:ext cx="6337609" cy="1368640"/>
+          </a:xfrm>
+          <a:prstGeom prst="flowChartTerminator">
+            <a:avLst/>
+          </a:prstGeom>
+        </p:spPr>
+        <p:style>
+          <a:lnRef idx="2">
+            <a:schemeClr val="accent3">
+              <a:shade val="15000"/>
+            </a:schemeClr>
+          </a:lnRef>
+          <a:fillRef idx="1">
+            <a:schemeClr val="accent3"/>
+          </a:fillRef>
+          <a:effectRef idx="0">
+            <a:schemeClr val="accent3"/>
+          </a:effectRef>
+          <a:fontRef idx="minor">
+            <a:schemeClr val="lt1"/>
+          </a:fontRef>
+        </p:style>
+        <p:txBody>
+          <a:bodyPr rtlCol="0" anchor="ctr"/>
+          <a:lstStyle/>
+          <a:p>
+            <a:pPr algn="ctr"/>
+            <a:endParaRPr lang="en-CA"/>
+          </a:p>
+        </p:txBody>
+      </p:sp>
       <p:sp>
         <p:nvSpPr>
           <p:cNvPr id="4" name="Isosceles Triangle 3">

</xml_diff>

<commit_message>
Offscreen FBO (from inside warehouse) applied to the softbody mesh because it's just like any other mesh
</commit_message>
<xml_diff>
--- a/6022_Phys_2_(2025)/Day2Day/W02/Vertlet integration.pptx
+++ b/6022_Phys_2_(2025)/Day2Day/W02/Vertlet integration.pptx
@@ -14,6 +14,7 @@
     <p:sldId id="261" r:id="rId8"/>
     <p:sldId id="264" r:id="rId9"/>
     <p:sldId id="262" r:id="rId10"/>
+    <p:sldId id="265" r:id="rId11"/>
   </p:sldIdLst>
   <p:sldSz cx="12192000" cy="6858000"/>
   <p:notesSz cx="6858000" cy="9144000"/>
@@ -251,7 +252,7 @@
           <a:p>
             <a:fld id="{B2683B1B-3CA0-49F0-913E-30D7B5476043}" type="datetimeFigureOut">
               <a:rPr lang="en-CA" smtClean="0"/>
-              <a:t>2025-01-20</a:t>
+              <a:t>2025-01-31</a:t>
             </a:fld>
             <a:endParaRPr lang="en-CA"/>
           </a:p>
@@ -421,7 +422,7 @@
           <a:p>
             <a:fld id="{B2683B1B-3CA0-49F0-913E-30D7B5476043}" type="datetimeFigureOut">
               <a:rPr lang="en-CA" smtClean="0"/>
-              <a:t>2025-01-20</a:t>
+              <a:t>2025-01-31</a:t>
             </a:fld>
             <a:endParaRPr lang="en-CA"/>
           </a:p>
@@ -601,7 +602,7 @@
           <a:p>
             <a:fld id="{B2683B1B-3CA0-49F0-913E-30D7B5476043}" type="datetimeFigureOut">
               <a:rPr lang="en-CA" smtClean="0"/>
-              <a:t>2025-01-20</a:t>
+              <a:t>2025-01-31</a:t>
             </a:fld>
             <a:endParaRPr lang="en-CA"/>
           </a:p>
@@ -771,7 +772,7 @@
           <a:p>
             <a:fld id="{B2683B1B-3CA0-49F0-913E-30D7B5476043}" type="datetimeFigureOut">
               <a:rPr lang="en-CA" smtClean="0"/>
-              <a:t>2025-01-20</a:t>
+              <a:t>2025-01-31</a:t>
             </a:fld>
             <a:endParaRPr lang="en-CA"/>
           </a:p>
@@ -1017,7 +1018,7 @@
           <a:p>
             <a:fld id="{B2683B1B-3CA0-49F0-913E-30D7B5476043}" type="datetimeFigureOut">
               <a:rPr lang="en-CA" smtClean="0"/>
-              <a:t>2025-01-20</a:t>
+              <a:t>2025-01-31</a:t>
             </a:fld>
             <a:endParaRPr lang="en-CA"/>
           </a:p>
@@ -1249,7 +1250,7 @@
           <a:p>
             <a:fld id="{B2683B1B-3CA0-49F0-913E-30D7B5476043}" type="datetimeFigureOut">
               <a:rPr lang="en-CA" smtClean="0"/>
-              <a:t>2025-01-20</a:t>
+              <a:t>2025-01-31</a:t>
             </a:fld>
             <a:endParaRPr lang="en-CA"/>
           </a:p>
@@ -1616,7 +1617,7 @@
           <a:p>
             <a:fld id="{B2683B1B-3CA0-49F0-913E-30D7B5476043}" type="datetimeFigureOut">
               <a:rPr lang="en-CA" smtClean="0"/>
-              <a:t>2025-01-20</a:t>
+              <a:t>2025-01-31</a:t>
             </a:fld>
             <a:endParaRPr lang="en-CA"/>
           </a:p>
@@ -1734,7 +1735,7 @@
           <a:p>
             <a:fld id="{B2683B1B-3CA0-49F0-913E-30D7B5476043}" type="datetimeFigureOut">
               <a:rPr lang="en-CA" smtClean="0"/>
-              <a:t>2025-01-20</a:t>
+              <a:t>2025-01-31</a:t>
             </a:fld>
             <a:endParaRPr lang="en-CA"/>
           </a:p>
@@ -1829,7 +1830,7 @@
           <a:p>
             <a:fld id="{B2683B1B-3CA0-49F0-913E-30D7B5476043}" type="datetimeFigureOut">
               <a:rPr lang="en-CA" smtClean="0"/>
-              <a:t>2025-01-20</a:t>
+              <a:t>2025-01-31</a:t>
             </a:fld>
             <a:endParaRPr lang="en-CA"/>
           </a:p>
@@ -2106,7 +2107,7 @@
           <a:p>
             <a:fld id="{B2683B1B-3CA0-49F0-913E-30D7B5476043}" type="datetimeFigureOut">
               <a:rPr lang="en-CA" smtClean="0"/>
-              <a:t>2025-01-20</a:t>
+              <a:t>2025-01-31</a:t>
             </a:fld>
             <a:endParaRPr lang="en-CA"/>
           </a:p>
@@ -2363,7 +2364,7 @@
           <a:p>
             <a:fld id="{B2683B1B-3CA0-49F0-913E-30D7B5476043}" type="datetimeFigureOut">
               <a:rPr lang="en-CA" smtClean="0"/>
-              <a:t>2025-01-20</a:t>
+              <a:t>2025-01-31</a:t>
             </a:fld>
             <a:endParaRPr lang="en-CA"/>
           </a:p>
@@ -2576,7 +2577,7 @@
           <a:p>
             <a:fld id="{B2683B1B-3CA0-49F0-913E-30D7B5476043}" type="datetimeFigureOut">
               <a:rPr lang="en-CA" smtClean="0"/>
-              <a:t>2025-01-20</a:t>
+              <a:t>2025-01-31</a:t>
             </a:fld>
             <a:endParaRPr lang="en-CA"/>
           </a:p>
@@ -3045,6 +3046,668 @@
     <p:extLst>
       <p:ext uri="{BB962C8B-B14F-4D97-AF65-F5344CB8AC3E}">
         <p14:creationId xmlns:p14="http://schemas.microsoft.com/office/powerpoint/2010/main" val="1934419637"/>
+      </p:ext>
+    </p:extLst>
+  </p:cSld>
+  <p:clrMapOvr>
+    <a:masterClrMapping/>
+  </p:clrMapOvr>
+</p:sld>
+</file>
+
+<file path=ppt/slides/slide10.xml><?xml version="1.0" encoding="utf-8"?>
+<p:sld xmlns:a="http://schemas.openxmlformats.org/drawingml/2006/main" xmlns:r="http://schemas.openxmlformats.org/officeDocument/2006/relationships" xmlns:p="http://schemas.openxmlformats.org/presentationml/2006/main">
+  <p:cSld>
+    <p:spTree>
+      <p:nvGrpSpPr>
+        <p:cNvPr id="1" name=""/>
+        <p:cNvGrpSpPr/>
+        <p:nvPr/>
+      </p:nvGrpSpPr>
+      <p:grpSpPr>
+        <a:xfrm>
+          <a:off x="0" y="0"/>
+          <a:ext cx="0" cy="0"/>
+          <a:chOff x="0" y="0"/>
+          <a:chExt cx="0" cy="0"/>
+        </a:xfrm>
+      </p:grpSpPr>
+      <p:grpSp>
+        <p:nvGrpSpPr>
+          <p:cNvPr id="20" name="Group 19">
+            <a:extLst>
+              <a:ext uri="{FF2B5EF4-FFF2-40B4-BE49-F238E27FC236}">
+                <a16:creationId xmlns:a16="http://schemas.microsoft.com/office/drawing/2014/main" id="{56371DFF-3A49-30D6-25F0-7DE2735E31BA}"/>
+              </a:ext>
+            </a:extLst>
+          </p:cNvPr>
+          <p:cNvGrpSpPr/>
+          <p:nvPr/>
+        </p:nvGrpSpPr>
+        <p:grpSpPr>
+          <a:xfrm>
+            <a:off x="712840" y="1264319"/>
+            <a:ext cx="10213257" cy="10337743"/>
+            <a:chOff x="2900514" y="1338423"/>
+            <a:chExt cx="5545393" cy="5612984"/>
+          </a:xfrm>
+        </p:grpSpPr>
+        <p:sp>
+          <p:nvSpPr>
+            <p:cNvPr id="4" name="Oval 3">
+              <a:extLst>
+                <a:ext uri="{FF2B5EF4-FFF2-40B4-BE49-F238E27FC236}">
+                  <a16:creationId xmlns:a16="http://schemas.microsoft.com/office/drawing/2014/main" id="{012555CD-38F4-EF00-46FB-51847877D5CB}"/>
+                </a:ext>
+              </a:extLst>
+            </p:cNvPr>
+            <p:cNvSpPr/>
+            <p:nvPr/>
+          </p:nvSpPr>
+          <p:spPr>
+            <a:xfrm>
+              <a:off x="2900514" y="1406014"/>
+              <a:ext cx="5545393" cy="5545393"/>
+            </a:xfrm>
+            <a:prstGeom prst="ellipse">
+              <a:avLst/>
+            </a:prstGeom>
+          </p:spPr>
+          <p:style>
+            <a:lnRef idx="2">
+              <a:schemeClr val="accent1">
+                <a:shade val="15000"/>
+              </a:schemeClr>
+            </a:lnRef>
+            <a:fillRef idx="1">
+              <a:schemeClr val="accent1"/>
+            </a:fillRef>
+            <a:effectRef idx="0">
+              <a:schemeClr val="accent1"/>
+            </a:effectRef>
+            <a:fontRef idx="minor">
+              <a:schemeClr val="lt1"/>
+            </a:fontRef>
+          </p:style>
+          <p:txBody>
+            <a:bodyPr rtlCol="0" anchor="ctr"/>
+            <a:lstStyle/>
+            <a:p>
+              <a:pPr algn="ctr"/>
+              <a:endParaRPr lang="en-CA"/>
+            </a:p>
+          </p:txBody>
+        </p:sp>
+        <p:sp>
+          <p:nvSpPr>
+            <p:cNvPr id="15" name="Oval 14">
+              <a:extLst>
+                <a:ext uri="{FF2B5EF4-FFF2-40B4-BE49-F238E27FC236}">
+                  <a16:creationId xmlns:a16="http://schemas.microsoft.com/office/drawing/2014/main" id="{6DF9EC86-772E-DF1D-B44F-393D5BC38914}"/>
+                </a:ext>
+              </a:extLst>
+            </p:cNvPr>
+            <p:cNvSpPr/>
+            <p:nvPr/>
+          </p:nvSpPr>
+          <p:spPr>
+            <a:xfrm>
+              <a:off x="5535563" y="4124633"/>
+              <a:ext cx="363792" cy="363792"/>
+            </a:xfrm>
+            <a:prstGeom prst="ellipse">
+              <a:avLst/>
+            </a:prstGeom>
+          </p:spPr>
+          <p:style>
+            <a:lnRef idx="0">
+              <a:schemeClr val="accent2"/>
+            </a:lnRef>
+            <a:fillRef idx="3">
+              <a:schemeClr val="accent2"/>
+            </a:fillRef>
+            <a:effectRef idx="3">
+              <a:schemeClr val="accent2"/>
+            </a:effectRef>
+            <a:fontRef idx="minor">
+              <a:schemeClr val="lt1"/>
+            </a:fontRef>
+          </p:style>
+          <p:txBody>
+            <a:bodyPr rtlCol="0" anchor="ctr"/>
+            <a:lstStyle/>
+            <a:p>
+              <a:pPr algn="ctr"/>
+              <a:endParaRPr lang="en-CA"/>
+            </a:p>
+          </p:txBody>
+        </p:sp>
+        <p:sp>
+          <p:nvSpPr>
+            <p:cNvPr id="23" name="Oval 22">
+              <a:extLst>
+                <a:ext uri="{FF2B5EF4-FFF2-40B4-BE49-F238E27FC236}">
+                  <a16:creationId xmlns:a16="http://schemas.microsoft.com/office/drawing/2014/main" id="{35189899-10FE-72EB-D372-7F74F3FCAFBF}"/>
+                </a:ext>
+              </a:extLst>
+            </p:cNvPr>
+            <p:cNvSpPr/>
+            <p:nvPr/>
+          </p:nvSpPr>
+          <p:spPr>
+            <a:xfrm>
+              <a:off x="5876510" y="1338423"/>
+              <a:ext cx="159052" cy="159052"/>
+            </a:xfrm>
+            <a:prstGeom prst="ellipse">
+              <a:avLst/>
+            </a:prstGeom>
+          </p:spPr>
+          <p:style>
+            <a:lnRef idx="0">
+              <a:schemeClr val="accent2"/>
+            </a:lnRef>
+            <a:fillRef idx="3">
+              <a:schemeClr val="accent2"/>
+            </a:fillRef>
+            <a:effectRef idx="3">
+              <a:schemeClr val="accent2"/>
+            </a:effectRef>
+            <a:fontRef idx="minor">
+              <a:schemeClr val="lt1"/>
+            </a:fontRef>
+          </p:style>
+          <p:txBody>
+            <a:bodyPr rtlCol="0" anchor="ctr"/>
+            <a:lstStyle/>
+            <a:p>
+              <a:pPr algn="ctr"/>
+              <a:endParaRPr lang="en-CA"/>
+            </a:p>
+          </p:txBody>
+        </p:sp>
+        <p:sp>
+          <p:nvSpPr>
+            <p:cNvPr id="24" name="Oval 23">
+              <a:extLst>
+                <a:ext uri="{FF2B5EF4-FFF2-40B4-BE49-F238E27FC236}">
+                  <a16:creationId xmlns:a16="http://schemas.microsoft.com/office/drawing/2014/main" id="{7FF2180E-5777-309B-C172-97328C62D37B}"/>
+                </a:ext>
+              </a:extLst>
+            </p:cNvPr>
+            <p:cNvSpPr/>
+            <p:nvPr/>
+          </p:nvSpPr>
+          <p:spPr>
+            <a:xfrm>
+              <a:off x="5968714" y="1349845"/>
+              <a:ext cx="159052" cy="159052"/>
+            </a:xfrm>
+            <a:prstGeom prst="ellipse">
+              <a:avLst/>
+            </a:prstGeom>
+          </p:spPr>
+          <p:style>
+            <a:lnRef idx="0">
+              <a:schemeClr val="accent2"/>
+            </a:lnRef>
+            <a:fillRef idx="3">
+              <a:schemeClr val="accent2"/>
+            </a:fillRef>
+            <a:effectRef idx="3">
+              <a:schemeClr val="accent2"/>
+            </a:effectRef>
+            <a:fontRef idx="minor">
+              <a:schemeClr val="lt1"/>
+            </a:fontRef>
+          </p:style>
+          <p:txBody>
+            <a:bodyPr rtlCol="0" anchor="ctr"/>
+            <a:lstStyle/>
+            <a:p>
+              <a:pPr algn="ctr"/>
+              <a:endParaRPr lang="en-CA"/>
+            </a:p>
+          </p:txBody>
+        </p:sp>
+      </p:grpSp>
+      <p:grpSp>
+        <p:nvGrpSpPr>
+          <p:cNvPr id="13" name="Group 12">
+            <a:extLst>
+              <a:ext uri="{FF2B5EF4-FFF2-40B4-BE49-F238E27FC236}">
+                <a16:creationId xmlns:a16="http://schemas.microsoft.com/office/drawing/2014/main" id="{D3478331-263B-035A-203B-8801EC8BFDE6}"/>
+              </a:ext>
+            </a:extLst>
+          </p:cNvPr>
+          <p:cNvGrpSpPr/>
+          <p:nvPr/>
+        </p:nvGrpSpPr>
+        <p:grpSpPr>
+          <a:xfrm>
+            <a:off x="1312604" y="2045109"/>
+            <a:ext cx="9379975" cy="349047"/>
+            <a:chOff x="1179871" y="634179"/>
+            <a:chExt cx="9379975" cy="349047"/>
+          </a:xfrm>
+        </p:grpSpPr>
+        <p:sp>
+          <p:nvSpPr>
+            <p:cNvPr id="5" name="Rectangle 4">
+              <a:extLst>
+                <a:ext uri="{FF2B5EF4-FFF2-40B4-BE49-F238E27FC236}">
+                  <a16:creationId xmlns:a16="http://schemas.microsoft.com/office/drawing/2014/main" id="{50B4BF11-432C-C3E9-9561-66E802F3CECD}"/>
+                </a:ext>
+              </a:extLst>
+            </p:cNvPr>
+            <p:cNvSpPr/>
+            <p:nvPr/>
+          </p:nvSpPr>
+          <p:spPr>
+            <a:xfrm>
+              <a:off x="1179871" y="707921"/>
+              <a:ext cx="9379975" cy="235975"/>
+            </a:xfrm>
+            <a:prstGeom prst="rect">
+              <a:avLst/>
+            </a:prstGeom>
+          </p:spPr>
+          <p:style>
+            <a:lnRef idx="2">
+              <a:schemeClr val="accent1">
+                <a:shade val="15000"/>
+              </a:schemeClr>
+            </a:lnRef>
+            <a:fillRef idx="1">
+              <a:schemeClr val="accent1"/>
+            </a:fillRef>
+            <a:effectRef idx="0">
+              <a:schemeClr val="accent1"/>
+            </a:effectRef>
+            <a:fontRef idx="minor">
+              <a:schemeClr val="lt1"/>
+            </a:fontRef>
+          </p:style>
+          <p:txBody>
+            <a:bodyPr rtlCol="0" anchor="ctr"/>
+            <a:lstStyle/>
+            <a:p>
+              <a:pPr algn="ctr"/>
+              <a:endParaRPr lang="en-CA"/>
+            </a:p>
+          </p:txBody>
+        </p:sp>
+        <p:sp>
+          <p:nvSpPr>
+            <p:cNvPr id="6" name="Oval 5">
+              <a:extLst>
+                <a:ext uri="{FF2B5EF4-FFF2-40B4-BE49-F238E27FC236}">
+                  <a16:creationId xmlns:a16="http://schemas.microsoft.com/office/drawing/2014/main" id="{7ED33DFF-B0F7-3AE5-8DE7-AA3AD53787E1}"/>
+                </a:ext>
+              </a:extLst>
+            </p:cNvPr>
+            <p:cNvSpPr/>
+            <p:nvPr/>
+          </p:nvSpPr>
+          <p:spPr>
+            <a:xfrm>
+              <a:off x="2212258" y="678426"/>
+              <a:ext cx="304800" cy="304800"/>
+            </a:xfrm>
+            <a:prstGeom prst="ellipse">
+              <a:avLst/>
+            </a:prstGeom>
+          </p:spPr>
+          <p:style>
+            <a:lnRef idx="2">
+              <a:schemeClr val="accent6">
+                <a:shade val="15000"/>
+              </a:schemeClr>
+            </a:lnRef>
+            <a:fillRef idx="1">
+              <a:schemeClr val="accent6"/>
+            </a:fillRef>
+            <a:effectRef idx="0">
+              <a:schemeClr val="accent6"/>
+            </a:effectRef>
+            <a:fontRef idx="minor">
+              <a:schemeClr val="lt1"/>
+            </a:fontRef>
+          </p:style>
+          <p:txBody>
+            <a:bodyPr rtlCol="0" anchor="ctr"/>
+            <a:lstStyle/>
+            <a:p>
+              <a:pPr algn="ctr"/>
+              <a:endParaRPr lang="en-CA"/>
+            </a:p>
+          </p:txBody>
+        </p:sp>
+        <p:sp>
+          <p:nvSpPr>
+            <p:cNvPr id="7" name="Oval 6">
+              <a:extLst>
+                <a:ext uri="{FF2B5EF4-FFF2-40B4-BE49-F238E27FC236}">
+                  <a16:creationId xmlns:a16="http://schemas.microsoft.com/office/drawing/2014/main" id="{AAA47D9F-C962-3908-A66D-E8ED241472E0}"/>
+                </a:ext>
+              </a:extLst>
+            </p:cNvPr>
+            <p:cNvSpPr/>
+            <p:nvPr/>
+          </p:nvSpPr>
+          <p:spPr>
+            <a:xfrm>
+              <a:off x="3608438" y="678426"/>
+              <a:ext cx="304800" cy="304800"/>
+            </a:xfrm>
+            <a:prstGeom prst="ellipse">
+              <a:avLst/>
+            </a:prstGeom>
+          </p:spPr>
+          <p:style>
+            <a:lnRef idx="2">
+              <a:schemeClr val="accent6">
+                <a:shade val="15000"/>
+              </a:schemeClr>
+            </a:lnRef>
+            <a:fillRef idx="1">
+              <a:schemeClr val="accent6"/>
+            </a:fillRef>
+            <a:effectRef idx="0">
+              <a:schemeClr val="accent6"/>
+            </a:effectRef>
+            <a:fontRef idx="minor">
+              <a:schemeClr val="lt1"/>
+            </a:fontRef>
+          </p:style>
+          <p:txBody>
+            <a:bodyPr rtlCol="0" anchor="ctr"/>
+            <a:lstStyle/>
+            <a:p>
+              <a:pPr algn="ctr"/>
+              <a:endParaRPr lang="en-CA"/>
+            </a:p>
+          </p:txBody>
+        </p:sp>
+        <p:sp>
+          <p:nvSpPr>
+            <p:cNvPr id="8" name="Oval 7">
+              <a:extLst>
+                <a:ext uri="{FF2B5EF4-FFF2-40B4-BE49-F238E27FC236}">
+                  <a16:creationId xmlns:a16="http://schemas.microsoft.com/office/drawing/2014/main" id="{94820674-3166-B264-3502-3254AD49350A}"/>
+                </a:ext>
+              </a:extLst>
+            </p:cNvPr>
+            <p:cNvSpPr/>
+            <p:nvPr/>
+          </p:nvSpPr>
+          <p:spPr>
+            <a:xfrm>
+              <a:off x="4852218" y="663676"/>
+              <a:ext cx="304800" cy="304800"/>
+            </a:xfrm>
+            <a:prstGeom prst="ellipse">
+              <a:avLst/>
+            </a:prstGeom>
+          </p:spPr>
+          <p:style>
+            <a:lnRef idx="2">
+              <a:schemeClr val="accent6">
+                <a:shade val="15000"/>
+              </a:schemeClr>
+            </a:lnRef>
+            <a:fillRef idx="1">
+              <a:schemeClr val="accent6"/>
+            </a:fillRef>
+            <a:effectRef idx="0">
+              <a:schemeClr val="accent6"/>
+            </a:effectRef>
+            <a:fontRef idx="minor">
+              <a:schemeClr val="lt1"/>
+            </a:fontRef>
+          </p:style>
+          <p:txBody>
+            <a:bodyPr rtlCol="0" anchor="ctr"/>
+            <a:lstStyle/>
+            <a:p>
+              <a:pPr algn="ctr"/>
+              <a:endParaRPr lang="en-CA"/>
+            </a:p>
+          </p:txBody>
+        </p:sp>
+        <p:sp>
+          <p:nvSpPr>
+            <p:cNvPr id="9" name="Oval 8">
+              <a:extLst>
+                <a:ext uri="{FF2B5EF4-FFF2-40B4-BE49-F238E27FC236}">
+                  <a16:creationId xmlns:a16="http://schemas.microsoft.com/office/drawing/2014/main" id="{079D9CFB-6803-5C53-8828-5E4096DE8796}"/>
+                </a:ext>
+              </a:extLst>
+            </p:cNvPr>
+            <p:cNvSpPr/>
+            <p:nvPr/>
+          </p:nvSpPr>
+          <p:spPr>
+            <a:xfrm>
+              <a:off x="6095998" y="663676"/>
+              <a:ext cx="304800" cy="304800"/>
+            </a:xfrm>
+            <a:prstGeom prst="ellipse">
+              <a:avLst/>
+            </a:prstGeom>
+          </p:spPr>
+          <p:style>
+            <a:lnRef idx="2">
+              <a:schemeClr val="accent6">
+                <a:shade val="15000"/>
+              </a:schemeClr>
+            </a:lnRef>
+            <a:fillRef idx="1">
+              <a:schemeClr val="accent6"/>
+            </a:fillRef>
+            <a:effectRef idx="0">
+              <a:schemeClr val="accent6"/>
+            </a:effectRef>
+            <a:fontRef idx="minor">
+              <a:schemeClr val="lt1"/>
+            </a:fontRef>
+          </p:style>
+          <p:txBody>
+            <a:bodyPr rtlCol="0" anchor="ctr"/>
+            <a:lstStyle/>
+            <a:p>
+              <a:pPr algn="ctr"/>
+              <a:endParaRPr lang="en-CA"/>
+            </a:p>
+          </p:txBody>
+        </p:sp>
+        <p:sp>
+          <p:nvSpPr>
+            <p:cNvPr id="10" name="Oval 9">
+              <a:extLst>
+                <a:ext uri="{FF2B5EF4-FFF2-40B4-BE49-F238E27FC236}">
+                  <a16:creationId xmlns:a16="http://schemas.microsoft.com/office/drawing/2014/main" id="{E71D0154-026E-C948-E221-66ADB2467DF6}"/>
+                </a:ext>
+              </a:extLst>
+            </p:cNvPr>
+            <p:cNvSpPr/>
+            <p:nvPr/>
+          </p:nvSpPr>
+          <p:spPr>
+            <a:xfrm>
+              <a:off x="7339778" y="658760"/>
+              <a:ext cx="304800" cy="304800"/>
+            </a:xfrm>
+            <a:prstGeom prst="ellipse">
+              <a:avLst/>
+            </a:prstGeom>
+          </p:spPr>
+          <p:style>
+            <a:lnRef idx="2">
+              <a:schemeClr val="accent6">
+                <a:shade val="15000"/>
+              </a:schemeClr>
+            </a:lnRef>
+            <a:fillRef idx="1">
+              <a:schemeClr val="accent6"/>
+            </a:fillRef>
+            <a:effectRef idx="0">
+              <a:schemeClr val="accent6"/>
+            </a:effectRef>
+            <a:fontRef idx="minor">
+              <a:schemeClr val="lt1"/>
+            </a:fontRef>
+          </p:style>
+          <p:txBody>
+            <a:bodyPr rtlCol="0" anchor="ctr"/>
+            <a:lstStyle/>
+            <a:p>
+              <a:pPr algn="ctr"/>
+              <a:endParaRPr lang="en-CA"/>
+            </a:p>
+          </p:txBody>
+        </p:sp>
+        <p:sp>
+          <p:nvSpPr>
+            <p:cNvPr id="11" name="Oval 10">
+              <a:extLst>
+                <a:ext uri="{FF2B5EF4-FFF2-40B4-BE49-F238E27FC236}">
+                  <a16:creationId xmlns:a16="http://schemas.microsoft.com/office/drawing/2014/main" id="{9260C63F-B863-5411-DC2A-D150577FCD7C}"/>
+                </a:ext>
+              </a:extLst>
+            </p:cNvPr>
+            <p:cNvSpPr/>
+            <p:nvPr/>
+          </p:nvSpPr>
+          <p:spPr>
+            <a:xfrm>
+              <a:off x="8583558" y="639096"/>
+              <a:ext cx="304800" cy="304800"/>
+            </a:xfrm>
+            <a:prstGeom prst="ellipse">
+              <a:avLst/>
+            </a:prstGeom>
+          </p:spPr>
+          <p:style>
+            <a:lnRef idx="2">
+              <a:schemeClr val="accent6">
+                <a:shade val="15000"/>
+              </a:schemeClr>
+            </a:lnRef>
+            <a:fillRef idx="1">
+              <a:schemeClr val="accent6"/>
+            </a:fillRef>
+            <a:effectRef idx="0">
+              <a:schemeClr val="accent6"/>
+            </a:effectRef>
+            <a:fontRef idx="minor">
+              <a:schemeClr val="lt1"/>
+            </a:fontRef>
+          </p:style>
+          <p:txBody>
+            <a:bodyPr rtlCol="0" anchor="ctr"/>
+            <a:lstStyle/>
+            <a:p>
+              <a:pPr algn="ctr"/>
+              <a:endParaRPr lang="en-CA"/>
+            </a:p>
+          </p:txBody>
+        </p:sp>
+        <p:sp>
+          <p:nvSpPr>
+            <p:cNvPr id="12" name="Oval 11">
+              <a:extLst>
+                <a:ext uri="{FF2B5EF4-FFF2-40B4-BE49-F238E27FC236}">
+                  <a16:creationId xmlns:a16="http://schemas.microsoft.com/office/drawing/2014/main" id="{76FBF0D7-074B-4360-6F42-EE131B4A0C50}"/>
+                </a:ext>
+              </a:extLst>
+            </p:cNvPr>
+            <p:cNvSpPr/>
+            <p:nvPr/>
+          </p:nvSpPr>
+          <p:spPr>
+            <a:xfrm>
+              <a:off x="9827338" y="634179"/>
+              <a:ext cx="304800" cy="304800"/>
+            </a:xfrm>
+            <a:prstGeom prst="ellipse">
+              <a:avLst/>
+            </a:prstGeom>
+          </p:spPr>
+          <p:style>
+            <a:lnRef idx="2">
+              <a:schemeClr val="accent6">
+                <a:shade val="15000"/>
+              </a:schemeClr>
+            </a:lnRef>
+            <a:fillRef idx="1">
+              <a:schemeClr val="accent6"/>
+            </a:fillRef>
+            <a:effectRef idx="0">
+              <a:schemeClr val="accent6"/>
+            </a:effectRef>
+            <a:fontRef idx="minor">
+              <a:schemeClr val="lt1"/>
+            </a:fontRef>
+          </p:style>
+          <p:txBody>
+            <a:bodyPr rtlCol="0" anchor="ctr"/>
+            <a:lstStyle/>
+            <a:p>
+              <a:pPr algn="ctr"/>
+              <a:endParaRPr lang="en-CA"/>
+            </a:p>
+          </p:txBody>
+        </p:sp>
+      </p:grpSp>
+      <p:cxnSp>
+        <p:nvCxnSpPr>
+          <p:cNvPr id="17" name="Straight Arrow Connector 16">
+            <a:extLst>
+              <a:ext uri="{FF2B5EF4-FFF2-40B4-BE49-F238E27FC236}">
+                <a16:creationId xmlns:a16="http://schemas.microsoft.com/office/drawing/2014/main" id="{BDBA932B-ACE8-E5B7-CD1C-88E3D208F98D}"/>
+              </a:ext>
+            </a:extLst>
+          </p:cNvPr>
+          <p:cNvCxnSpPr>
+            <a:cxnSpLocks/>
+          </p:cNvCxnSpPr>
+          <p:nvPr/>
+        </p:nvCxnSpPr>
+        <p:spPr>
+          <a:xfrm flipV="1">
+            <a:off x="5900963" y="1474839"/>
+            <a:ext cx="585867" cy="5256006"/>
+          </a:xfrm>
+          <a:prstGeom prst="straightConnector1">
+            <a:avLst/>
+          </a:prstGeom>
+          <a:ln w="66675">
+            <a:solidFill>
+              <a:srgbClr val="FFFF00"/>
+            </a:solidFill>
+            <a:tailEnd type="triangle"/>
+          </a:ln>
+        </p:spPr>
+        <p:style>
+          <a:lnRef idx="3">
+            <a:schemeClr val="accent4"/>
+          </a:lnRef>
+          <a:fillRef idx="0">
+            <a:schemeClr val="accent4"/>
+          </a:fillRef>
+          <a:effectRef idx="2">
+            <a:schemeClr val="accent4"/>
+          </a:effectRef>
+          <a:fontRef idx="minor">
+            <a:schemeClr val="tx1"/>
+          </a:fontRef>
+        </p:style>
+      </p:cxnSp>
+    </p:spTree>
+    <p:extLst>
+      <p:ext uri="{BB962C8B-B14F-4D97-AF65-F5344CB8AC3E}">
+        <p14:creationId xmlns:p14="http://schemas.microsoft.com/office/powerpoint/2010/main" val="2685479952"/>
       </p:ext>
     </p:extLst>
   </p:cSld>

</xml_diff>